<commit_message>
Fix sem1 les8 presentation
</commit_message>
<xml_diff>
--- a/lessons/sem01/lesson08/decorators.pptx
+++ b/lessons/sem01/lesson08/decorators.pptx
@@ -40223,7 +40223,7 @@
         <p:spPr>
           <a:xfrm>
             <a:off x="880110" y="2192020"/>
-            <a:ext cx="20349845" cy="10243185"/>
+            <a:ext cx="21312505" cy="10243185"/>
           </a:xfrm>
           <a:prstGeom prst="rect">
             <a:avLst/>
@@ -40774,17 +40774,19 @@
             <a:r>
               <a:rPr lang="en-US" altLang="ru-RU" sz="5400">
                 <a:solidFill>
-                  <a:srgbClr val="EDDBAD"/>
-                </a:solidFill>
-                <a:latin typeface="Consolas" panose="020B0609020204030204" charset="0"/>
-                <a:cs typeface="Consolas" panose="020B0609020204030204" charset="0"/>
-              </a:rPr>
-              <a:t>do_something</a:t>
-            </a:r>
-            <a:r>
-              <a:rPr lang="en-US" altLang="ru-RU" sz="5400">
-                <a:latin typeface="Consolas" panose="020B0609020204030204" charset="0"/>
-                <a:cs typeface="Consolas" panose="020B0609020204030204" charset="0"/>
+                  <a:srgbClr val="BCD6FD"/>
+                </a:solidFill>
+                <a:latin typeface="Consolas" panose="020B0609020204030204" charset="0"/>
+                <a:cs typeface="Consolas" panose="020B0609020204030204" charset="0"/>
+                <a:sym typeface="+mn-ea"/>
+              </a:rPr>
+              <a:t>register_decorator</a:t>
+            </a:r>
+            <a:r>
+              <a:rPr lang="en-US" altLang="ru-RU" sz="5400">
+                <a:latin typeface="Consolas" panose="020B0609020204030204" charset="0"/>
+                <a:cs typeface="Consolas" panose="020B0609020204030204" charset="0"/>
+                <a:sym typeface="+mn-ea"/>
               </a:rPr>
               <a:t> </a:t>
             </a:r>
@@ -40798,6 +40800,7 @@
                 </a:solidFill>
                 <a:latin typeface="Consolas" panose="020B0609020204030204" charset="0"/>
                 <a:cs typeface="Consolas" panose="020B0609020204030204" charset="0"/>
+                <a:sym typeface="+mn-ea"/>
               </a:rPr>
               <a:t>=</a:t>
             </a:r>
@@ -40805,8 +40808,20 @@
               <a:rPr lang="en-US" altLang="ru-RU" sz="5400">
                 <a:latin typeface="Consolas" panose="020B0609020204030204" charset="0"/>
                 <a:cs typeface="Consolas" panose="020B0609020204030204" charset="0"/>
+                <a:sym typeface="+mn-ea"/>
               </a:rPr>
               <a:t> </a:t>
+            </a:r>
+            <a:r>
+              <a:rPr lang="en-US" altLang="ru-RU" sz="5400">
+                <a:solidFill>
+                  <a:srgbClr val="EDDBAD"/>
+                </a:solidFill>
+                <a:latin typeface="Consolas" panose="020B0609020204030204" charset="0"/>
+                <a:cs typeface="Consolas" panose="020B0609020204030204" charset="0"/>
+                <a:sym typeface="+mn-ea"/>
+              </a:rPr>
+              <a:t>register</a:t>
             </a:r>
             <a:r>
               <a:rPr lang="en-US" altLang="ru-RU" sz="5400">
@@ -40818,8 +40833,67 @@
                 </a:solidFill>
                 <a:latin typeface="Consolas" panose="020B0609020204030204" charset="0"/>
                 <a:cs typeface="Consolas" panose="020B0609020204030204" charset="0"/>
+                <a:sym typeface="+mn-ea"/>
               </a:rPr>
               <a:t>(</a:t>
+            </a:r>
+            <a:r>
+              <a:rPr lang="en-US" altLang="ru-RU" sz="5400">
+                <a:solidFill>
+                  <a:srgbClr val="E3C496"/>
+                </a:solidFill>
+                <a:latin typeface="Consolas" panose="020B0609020204030204" charset="0"/>
+                <a:cs typeface="Consolas" panose="020B0609020204030204" charset="0"/>
+                <a:sym typeface="+mn-ea"/>
+              </a:rPr>
+              <a:t>"do_something"</a:t>
+            </a:r>
+            <a:r>
+              <a:rPr lang="en-US" altLang="ru-RU" sz="5400">
+                <a:solidFill>
+                  <a:schemeClr val="bg2">
+                    <a:lumMod val="40000"/>
+                    <a:lumOff val="60000"/>
+                  </a:schemeClr>
+                </a:solidFill>
+                <a:latin typeface="Consolas" panose="020B0609020204030204" charset="0"/>
+                <a:cs typeface="Consolas" panose="020B0609020204030204" charset="0"/>
+                <a:sym typeface="+mn-ea"/>
+              </a:rPr>
+              <a:t>,</a:t>
+            </a:r>
+            <a:r>
+              <a:rPr lang="en-US" altLang="ru-RU" sz="5400">
+                <a:latin typeface="Consolas" panose="020B0609020204030204" charset="0"/>
+                <a:cs typeface="Consolas" panose="020B0609020204030204" charset="0"/>
+                <a:sym typeface="+mn-ea"/>
+              </a:rPr>
+              <a:t> </a:t>
+            </a:r>
+            <a:r>
+              <a:rPr lang="en-US" altLang="ru-RU" sz="5400">
+                <a:solidFill>
+                  <a:srgbClr val="BCD6FD"/>
+                </a:solidFill>
+                <a:latin typeface="Consolas" panose="020B0609020204030204" charset="0"/>
+                <a:cs typeface="Consolas" panose="020B0609020204030204" charset="0"/>
+                <a:sym typeface="+mn-ea"/>
+              </a:rPr>
+              <a:t>registry</a:t>
+            </a:r>
+            <a:r>
+              <a:rPr lang="en-US" altLang="ru-RU" sz="5400">
+                <a:solidFill>
+                  <a:schemeClr val="accent1">
+                    <a:lumMod val="20000"/>
+                    <a:lumOff val="80000"/>
+                  </a:schemeClr>
+                </a:solidFill>
+                <a:latin typeface="Consolas" panose="020B0609020204030204" charset="0"/>
+                <a:cs typeface="Consolas" panose="020B0609020204030204" charset="0"/>
+                <a:sym typeface="+mn-ea"/>
+              </a:rPr>
+              <a:t>)</a:t>
             </a:r>
             <a:endParaRPr lang="en-US" altLang="ru-RU" sz="5400">
               <a:latin typeface="Consolas" panose="020B0609020204030204" charset="0"/>
@@ -40835,20 +40909,55 @@
             </a:pPr>
             <a:r>
               <a:rPr lang="en-US" altLang="ru-RU" sz="5400">
-                <a:latin typeface="Consolas" panose="020B0609020204030204" charset="0"/>
-                <a:cs typeface="Consolas" panose="020B0609020204030204" charset="0"/>
-              </a:rPr>
-              <a:t>    </a:t>
-            </a:r>
-            <a:r>
-              <a:rPr lang="en-US" altLang="ru-RU" sz="5400">
                 <a:solidFill>
                   <a:srgbClr val="EDDBAD"/>
                 </a:solidFill>
                 <a:latin typeface="Consolas" panose="020B0609020204030204" charset="0"/>
                 <a:cs typeface="Consolas" panose="020B0609020204030204" charset="0"/>
-              </a:rPr>
-              <a:t>register</a:t>
+                <a:sym typeface="+mn-ea"/>
+              </a:rPr>
+              <a:t>do_something</a:t>
+            </a:r>
+            <a:r>
+              <a:rPr lang="en-US" altLang="ru-RU" sz="5400">
+                <a:latin typeface="Consolas" panose="020B0609020204030204" charset="0"/>
+                <a:cs typeface="Consolas" panose="020B0609020204030204" charset="0"/>
+                <a:sym typeface="+mn-ea"/>
+              </a:rPr>
+              <a:t> </a:t>
+            </a:r>
+            <a:r>
+              <a:rPr lang="en-US" altLang="ru-RU" sz="5400">
+                <a:solidFill>
+                  <a:schemeClr val="bg2">
+                    <a:lumMod val="40000"/>
+                    <a:lumOff val="60000"/>
+                  </a:schemeClr>
+                </a:solidFill>
+                <a:latin typeface="Consolas" panose="020B0609020204030204" charset="0"/>
+                <a:cs typeface="Consolas" panose="020B0609020204030204" charset="0"/>
+                <a:sym typeface="+mn-ea"/>
+              </a:rPr>
+              <a:t>=</a:t>
+            </a:r>
+            <a:r>
+              <a:rPr lang="en-US" altLang="ru-RU" sz="5400">
+                <a:latin typeface="Consolas" panose="020B0609020204030204" charset="0"/>
+                <a:cs typeface="Consolas" panose="020B0609020204030204" charset="0"/>
+                <a:sym typeface="+mn-ea"/>
+              </a:rPr>
+              <a:t> </a:t>
+            </a:r>
+            <a:r>
+              <a:rPr lang="en-US" altLang="ru-RU" sz="5400">
+                <a:solidFill>
+                  <a:srgbClr val="BCD6FD"/>
+                </a:solidFill>
+                <a:latin typeface="Consolas" panose="020B0609020204030204" charset="0"/>
+                <a:cs typeface="Consolas" panose="020B0609020204030204" charset="0"/>
+                <a:sym typeface="+mn-ea"/>
+              </a:rPr>
+              <a:t>register_decorator</a:t>
             </a:r>
             <a:r>
               <a:rPr lang="en-US" altLang="ru-RU" sz="5400">
@@ -40860,48 +40969,20 @@
                 </a:solidFill>
                 <a:latin typeface="Consolas" panose="020B0609020204030204" charset="0"/>
                 <a:cs typeface="Consolas" panose="020B0609020204030204" charset="0"/>
+                <a:sym typeface="+mn-ea"/>
               </a:rPr>
               <a:t>(</a:t>
             </a:r>
             <a:r>
               <a:rPr lang="en-US" altLang="ru-RU" sz="5400">
                 <a:solidFill>
-                  <a:srgbClr val="E3C496"/>
-                </a:solidFill>
-                <a:latin typeface="Consolas" panose="020B0609020204030204" charset="0"/>
-                <a:cs typeface="Consolas" panose="020B0609020204030204" charset="0"/>
-              </a:rPr>
-              <a:t>"do_something"</a:t>
-            </a:r>
-            <a:r>
-              <a:rPr lang="en-US" altLang="ru-RU" sz="5400">
-                <a:solidFill>
-                  <a:schemeClr val="bg2">
-                    <a:lumMod val="40000"/>
-                    <a:lumOff val="60000"/>
-                  </a:schemeClr>
-                </a:solidFill>
-                <a:latin typeface="Consolas" panose="020B0609020204030204" charset="0"/>
-                <a:cs typeface="Consolas" panose="020B0609020204030204" charset="0"/>
-              </a:rPr>
-              <a:t>,</a:t>
-            </a:r>
-            <a:r>
-              <a:rPr lang="en-US" altLang="ru-RU" sz="5400">
-                <a:latin typeface="Consolas" panose="020B0609020204030204" charset="0"/>
-                <a:cs typeface="Consolas" panose="020B0609020204030204" charset="0"/>
-              </a:rPr>
-              <a:t> </a:t>
-            </a:r>
-            <a:r>
-              <a:rPr lang="en-US" altLang="ru-RU" sz="5400">
-                <a:solidFill>
-                  <a:srgbClr val="BCD6FD"/>
-                </a:solidFill>
-                <a:latin typeface="Consolas" panose="020B0609020204030204" charset="0"/>
-                <a:cs typeface="Consolas" panose="020B0609020204030204" charset="0"/>
-              </a:rPr>
-              <a:t>registry</a:t>
+                  <a:srgbClr val="EDDBAD"/>
+                </a:solidFill>
+                <a:latin typeface="Consolas" panose="020B0609020204030204" charset="0"/>
+                <a:cs typeface="Consolas" panose="020B0609020204030204" charset="0"/>
+                <a:sym typeface="+mn-ea"/>
+              </a:rPr>
+              <a:t>do_something</a:t>
             </a:r>
             <a:r>
               <a:rPr lang="en-US" altLang="ru-RU" sz="5400">
@@ -40913,54 +40994,7 @@
                 </a:solidFill>
                 <a:latin typeface="Consolas" panose="020B0609020204030204" charset="0"/>
                 <a:cs typeface="Consolas" panose="020B0609020204030204" charset="0"/>
-              </a:rPr>
-              <a:t>)(</a:t>
-            </a:r>
-            <a:r>
-              <a:rPr lang="en-US" altLang="ru-RU" sz="5400">
-                <a:solidFill>
-                  <a:srgbClr val="EDDBAD"/>
-                </a:solidFill>
-                <a:latin typeface="Consolas" panose="020B0609020204030204" charset="0"/>
-                <a:cs typeface="Consolas" panose="020B0609020204030204" charset="0"/>
-              </a:rPr>
-              <a:t>do_something</a:t>
-            </a:r>
-            <a:r>
-              <a:rPr lang="en-US" altLang="ru-RU" sz="5400">
-                <a:solidFill>
-                  <a:schemeClr val="accent1">
-                    <a:lumMod val="20000"/>
-                    <a:lumOff val="80000"/>
-                  </a:schemeClr>
-                </a:solidFill>
-                <a:latin typeface="Consolas" panose="020B0609020204030204" charset="0"/>
-                <a:cs typeface="Consolas" panose="020B0609020204030204" charset="0"/>
-              </a:rPr>
-              <a:t>)</a:t>
-            </a:r>
-            <a:endParaRPr lang="en-US" altLang="ru-RU" sz="5400">
-              <a:latin typeface="Consolas" panose="020B0609020204030204" charset="0"/>
-              <a:cs typeface="Consolas" panose="020B0609020204030204" charset="0"/>
-            </a:endParaRPr>
-          </a:p>
-          <a:p>
-            <a:pPr marL="0" indent="0">
-              <a:lnSpc>
-                <a:spcPct val="100000"/>
-              </a:lnSpc>
-              <a:buFont typeface="Arial" panose="020B0604020202020204" pitchFamily="34" charset="0"/>
-            </a:pPr>
-            <a:r>
-              <a:rPr lang="en-US" altLang="ru-RU" sz="5400">
-                <a:solidFill>
-                  <a:schemeClr val="accent1">
-                    <a:lumMod val="20000"/>
-                    <a:lumOff val="80000"/>
-                  </a:schemeClr>
-                </a:solidFill>
-                <a:latin typeface="Consolas" panose="020B0609020204030204" charset="0"/>
-                <a:cs typeface="Consolas" panose="020B0609020204030204" charset="0"/>
+                <a:sym typeface="+mn-ea"/>
               </a:rPr>
               <a:t>)</a:t>
             </a:r>
@@ -40973,6 +41007,7 @@
               </a:solidFill>
               <a:latin typeface="Consolas" panose="020B0609020204030204" charset="0"/>
               <a:cs typeface="Consolas" panose="020B0609020204030204" charset="0"/>
+              <a:sym typeface="+mn-ea"/>
             </a:endParaRPr>
           </a:p>
         </p:txBody>
@@ -41088,7 +41123,7 @@
         <p:spPr>
           <a:xfrm>
             <a:off x="880110" y="2192020"/>
-            <a:ext cx="20349845" cy="10243185"/>
+            <a:ext cx="21773515" cy="10243185"/>
           </a:xfrm>
           <a:prstGeom prst="rect">
             <a:avLst/>
@@ -41628,6 +41663,9 @@
               <a:t>)</a:t>
             </a:r>
             <a:endParaRPr lang="en-US" altLang="ru-RU" sz="5400">
+              <a:solidFill>
+                <a:schemeClr val="accent1"/>
+              </a:solidFill>
               <a:latin typeface="Consolas" panose="020B0609020204030204" charset="0"/>
               <a:cs typeface="Consolas" panose="020B0609020204030204" charset="0"/>
             </a:endParaRPr>
@@ -41654,29 +41692,88 @@
             <a:r>
               <a:rPr lang="en-US" altLang="ru-RU" sz="5400">
                 <a:solidFill>
+                  <a:schemeClr val="accent1">
+                    <a:lumMod val="50000"/>
+                  </a:schemeClr>
+                </a:solidFill>
+                <a:latin typeface="Consolas" panose="020B0609020204030204" charset="0"/>
+                <a:cs typeface="Consolas" panose="020B0609020204030204" charset="0"/>
+              </a:rPr>
+              <a:t>register_decorator</a:t>
+            </a:r>
+            <a:r>
+              <a:rPr lang="en-US" altLang="ru-RU" sz="5400">
+                <a:latin typeface="Consolas" panose="020B0609020204030204" charset="0"/>
+                <a:cs typeface="Consolas" panose="020B0609020204030204" charset="0"/>
+              </a:rPr>
+              <a:t> = </a:t>
+            </a:r>
+            <a:r>
+              <a:rPr lang="en-US" altLang="ru-RU" sz="5400">
+                <a:solidFill>
                   <a:srgbClr val="C09D29"/>
                 </a:solidFill>
                 <a:latin typeface="Consolas" panose="020B0609020204030204" charset="0"/>
                 <a:cs typeface="Consolas" panose="020B0609020204030204" charset="0"/>
-              </a:rPr>
-              <a:t>do_something</a:t>
-            </a:r>
-            <a:r>
-              <a:rPr lang="en-US" altLang="ru-RU" sz="5400">
-                <a:latin typeface="Consolas" panose="020B0609020204030204" charset="0"/>
-                <a:cs typeface="Consolas" panose="020B0609020204030204" charset="0"/>
-              </a:rPr>
-              <a:t> = </a:t>
-            </a:r>
-            <a:r>
-              <a:rPr lang="en-US" altLang="ru-RU" sz="5400">
-                <a:solidFill>
-                  <a:schemeClr val="accent1"/>
-                </a:solidFill>
-                <a:latin typeface="Consolas" panose="020B0609020204030204" charset="0"/>
-                <a:cs typeface="Consolas" panose="020B0609020204030204" charset="0"/>
+                <a:sym typeface="+mn-ea"/>
+              </a:rPr>
+              <a:t>register</a:t>
+            </a:r>
+            <a:r>
+              <a:rPr lang="en-US" altLang="ru-RU" sz="5400">
+                <a:solidFill>
+                  <a:schemeClr val="accent1"/>
+                </a:solidFill>
+                <a:latin typeface="Consolas" panose="020B0609020204030204" charset="0"/>
+                <a:cs typeface="Consolas" panose="020B0609020204030204" charset="0"/>
+                <a:sym typeface="+mn-ea"/>
               </a:rPr>
               <a:t>(</a:t>
+            </a:r>
+            <a:r>
+              <a:rPr lang="en-US" altLang="ru-RU" sz="5400">
+                <a:solidFill>
+                  <a:schemeClr val="accent4">
+                    <a:lumMod val="50000"/>
+                  </a:schemeClr>
+                </a:solidFill>
+                <a:latin typeface="Consolas" panose="020B0609020204030204" charset="0"/>
+                <a:cs typeface="Consolas" panose="020B0609020204030204" charset="0"/>
+                <a:sym typeface="+mn-ea"/>
+              </a:rPr>
+              <a:t>"do_something"</a:t>
+            </a:r>
+            <a:r>
+              <a:rPr lang="en-US" altLang="ru-RU" sz="5400">
+                <a:latin typeface="Consolas" panose="020B0609020204030204" charset="0"/>
+                <a:cs typeface="Consolas" panose="020B0609020204030204" charset="0"/>
+                <a:sym typeface="+mn-ea"/>
+              </a:rPr>
+              <a:t>, </a:t>
+            </a:r>
+            <a:r>
+              <a:rPr lang="en-US" altLang="ru-RU" sz="5400">
+                <a:solidFill>
+                  <a:schemeClr val="accent1">
+                    <a:lumMod val="50000"/>
+                  </a:schemeClr>
+                </a:solidFill>
+                <a:latin typeface="Consolas" panose="020B0609020204030204" charset="0"/>
+                <a:cs typeface="Consolas" panose="020B0609020204030204" charset="0"/>
+                <a:sym typeface="+mn-ea"/>
+              </a:rPr>
+              <a:t>registry</a:t>
+            </a:r>
+            <a:r>
+              <a:rPr lang="en-US" altLang="ru-RU" sz="5400">
+                <a:solidFill>
+                  <a:schemeClr val="accent1"/>
+                </a:solidFill>
+                <a:latin typeface="Consolas" panose="020B0609020204030204" charset="0"/>
+                <a:cs typeface="Consolas" panose="020B0609020204030204" charset="0"/>
+                <a:sym typeface="+mn-ea"/>
+              </a:rPr>
+              <a:t>)</a:t>
             </a:r>
             <a:endParaRPr lang="en-US" altLang="ru-RU" sz="5400">
               <a:latin typeface="Consolas" panose="020B0609020204030204" charset="0"/>
@@ -41692,20 +41789,33 @@
             </a:pPr>
             <a:r>
               <a:rPr lang="en-US" altLang="ru-RU" sz="5400">
-                <a:latin typeface="Consolas" panose="020B0609020204030204" charset="0"/>
-                <a:cs typeface="Consolas" panose="020B0609020204030204" charset="0"/>
-              </a:rPr>
-              <a:t>    </a:t>
-            </a:r>
-            <a:r>
-              <a:rPr lang="en-US" altLang="ru-RU" sz="5400">
                 <a:solidFill>
                   <a:srgbClr val="C09D29"/>
                 </a:solidFill>
                 <a:latin typeface="Consolas" panose="020B0609020204030204" charset="0"/>
                 <a:cs typeface="Consolas" panose="020B0609020204030204" charset="0"/>
               </a:rPr>
-              <a:t>register</a:t>
+              <a:t>do_something</a:t>
+            </a:r>
+            <a:r>
+              <a:rPr lang="en-US" altLang="ru-RU" sz="5400">
+                <a:latin typeface="Consolas" panose="020B0609020204030204" charset="0"/>
+                <a:cs typeface="Consolas" panose="020B0609020204030204" charset="0"/>
+              </a:rPr>
+              <a:t> = </a:t>
+            </a:r>
+            <a:r>
+              <a:rPr lang="en-US" altLang="ru-RU" sz="5400">
+                <a:solidFill>
+                  <a:schemeClr val="accent1">
+                    <a:lumMod val="50000"/>
+                  </a:schemeClr>
+                </a:solidFill>
+                <a:latin typeface="Consolas" panose="020B0609020204030204" charset="0"/>
+                <a:cs typeface="Consolas" panose="020B0609020204030204" charset="0"/>
+                <a:sym typeface="+mn-ea"/>
+              </a:rPr>
+              <a:t>register_decorator</a:t>
             </a:r>
             <a:r>
               <a:rPr lang="en-US" altLang="ru-RU" sz="5400">
@@ -41720,47 +41830,6 @@
             <a:r>
               <a:rPr lang="en-US" altLang="ru-RU" sz="5400">
                 <a:solidFill>
-                  <a:schemeClr val="accent4">
-                    <a:lumMod val="50000"/>
-                  </a:schemeClr>
-                </a:solidFill>
-                <a:latin typeface="Consolas" panose="020B0609020204030204" charset="0"/>
-                <a:cs typeface="Consolas" panose="020B0609020204030204" charset="0"/>
-              </a:rPr>
-              <a:t>"do_something"</a:t>
-            </a:r>
-            <a:r>
-              <a:rPr lang="en-US" altLang="ru-RU" sz="5400">
-                <a:latin typeface="Consolas" panose="020B0609020204030204" charset="0"/>
-                <a:cs typeface="Consolas" panose="020B0609020204030204" charset="0"/>
-              </a:rPr>
-              <a:t>, </a:t>
-            </a:r>
-            <a:r>
-              <a:rPr lang="en-US" altLang="ru-RU" sz="5400">
-                <a:solidFill>
-                  <a:schemeClr val="accent1">
-                    <a:lumMod val="50000"/>
-                  </a:schemeClr>
-                </a:solidFill>
-                <a:latin typeface="Consolas" panose="020B0609020204030204" charset="0"/>
-                <a:cs typeface="Consolas" panose="020B0609020204030204" charset="0"/>
-              </a:rPr>
-              <a:t>registry</a:t>
-            </a:r>
-            <a:r>
-              <a:rPr lang="en-US" altLang="ru-RU" sz="5400">
-                <a:solidFill>
-                  <a:schemeClr val="accent1"/>
-                </a:solidFill>
-                <a:latin typeface="Consolas" panose="020B0609020204030204" charset="0"/>
-                <a:cs typeface="Consolas" panose="020B0609020204030204" charset="0"/>
-              </a:rPr>
-              <a:t>)(</a:t>
-            </a:r>
-            <a:r>
-              <a:rPr lang="en-US" altLang="ru-RU" sz="5400">
-                <a:solidFill>
                   <a:srgbClr val="C09D29"/>
                 </a:solidFill>
                 <a:latin typeface="Consolas" panose="020B0609020204030204" charset="0"/>
@@ -41768,28 +41837,6 @@
               </a:rPr>
               <a:t>do_something</a:t>
             </a:r>
-            <a:r>
-              <a:rPr lang="en-US" altLang="ru-RU" sz="5400">
-                <a:solidFill>
-                  <a:schemeClr val="accent1"/>
-                </a:solidFill>
-                <a:latin typeface="Consolas" panose="020B0609020204030204" charset="0"/>
-                <a:cs typeface="Consolas" panose="020B0609020204030204" charset="0"/>
-              </a:rPr>
-              <a:t>)</a:t>
-            </a:r>
-            <a:endParaRPr lang="en-US" altLang="ru-RU" sz="5400">
-              <a:latin typeface="Consolas" panose="020B0609020204030204" charset="0"/>
-              <a:cs typeface="Consolas" panose="020B0609020204030204" charset="0"/>
-            </a:endParaRPr>
-          </a:p>
-          <a:p>
-            <a:pPr marL="0" indent="0">
-              <a:lnSpc>
-                <a:spcPct val="100000"/>
-              </a:lnSpc>
-              <a:buFont typeface="Arial" panose="020B0604020202020204" pitchFamily="34" charset="0"/>
-            </a:pPr>
             <a:r>
               <a:rPr lang="en-US" altLang="ru-RU" sz="5400">
                 <a:solidFill>

</xml_diff>